<commit_message>
Fix errors in sequence diagrams
</commit_message>
<xml_diff>
--- a/docs/diagrams/FolderOperationsSequenceDiagrams.pptx
+++ b/docs/diagrams/FolderOperationsSequenceDiagrams.pptx
@@ -9883,8 +9883,8 @@
         </p:nvSpPr>
         <p:spPr>
           <a:xfrm>
-            <a:off x="4353657" y="4391503"/>
-            <a:ext cx="4269552" cy="1721555"/>
+            <a:off x="4361914" y="4391503"/>
+            <a:ext cx="4261295" cy="1721555"/>
           </a:xfrm>
           <a:prstGeom prst="rect">
             <a:avLst/>
@@ -10262,8 +10262,8 @@
         </p:nvSpPr>
         <p:spPr>
           <a:xfrm>
-            <a:off x="6578648" y="4932107"/>
-            <a:ext cx="1651179" cy="369588"/>
+            <a:off x="6675599" y="4941114"/>
+            <a:ext cx="1364281" cy="369588"/>
           </a:xfrm>
           <a:prstGeom prst="rect">
             <a:avLst/>
@@ -10289,24 +10289,14 @@
           <a:p>
             <a:pPr algn="ctr"/>
             <a:r>
-              <a:rPr lang="en-US" sz="1201" dirty="0">
+              <a:rPr lang="en-US" sz="1201" dirty="0" err="1">
                 <a:solidFill>
                   <a:schemeClr val="accent4">
                     <a:lumMod val="75000"/>
                   </a:schemeClr>
                 </a:solidFill>
               </a:rPr>
-              <a:t> </a:t>
-            </a:r>
-            <a:r>
-              <a:rPr lang="en-US" sz="1201" dirty="0" err="1">
-                <a:solidFill>
-                  <a:schemeClr val="accent4">
-                    <a:lumMod val="75000"/>
-                  </a:schemeClr>
-                </a:solidFill>
-              </a:rPr>
-              <a:t>model.enterFolder</a:t>
+              <a:t>enterFolder</a:t>
             </a:r>
             <a:r>
               <a:rPr lang="en-US" sz="1201" dirty="0">
@@ -10791,8 +10781,8 @@
         </p:nvSpPr>
         <p:spPr>
           <a:xfrm>
-            <a:off x="178594" y="417147"/>
-            <a:ext cx="8295138" cy="5482004"/>
+            <a:off x="178593" y="417147"/>
+            <a:ext cx="8336699" cy="5482004"/>
           </a:xfrm>
           <a:prstGeom prst="roundRect">
             <a:avLst>
@@ -10855,8 +10845,8 @@
         </p:nvSpPr>
         <p:spPr>
           <a:xfrm>
-            <a:off x="8670811" y="417145"/>
-            <a:ext cx="1508126" cy="5482005"/>
+            <a:off x="8665936" y="417145"/>
+            <a:ext cx="1448484" cy="5482005"/>
           </a:xfrm>
           <a:prstGeom prst="roundRect">
             <a:avLst>
@@ -10980,8 +10970,8 @@
         </p:nvCxnSpPr>
         <p:spPr>
           <a:xfrm flipH="1">
-            <a:off x="9424874" y="1270795"/>
-            <a:ext cx="10390" cy="4628355"/>
+            <a:off x="9390178" y="1270795"/>
+            <a:ext cx="45086" cy="4628355"/>
           </a:xfrm>
           <a:prstGeom prst="line">
             <a:avLst/>
@@ -12371,7 +12361,7 @@
         </p:nvCxnSpPr>
         <p:spPr>
           <a:xfrm flipV="1">
-            <a:off x="1626225" y="4726645"/>
+            <a:off x="1637800" y="4726645"/>
             <a:ext cx="4064332" cy="7570"/>
           </a:xfrm>
           <a:prstGeom prst="straightConnector1">
@@ -12518,7 +12508,7 @@
         </p:nvCxnSpPr>
         <p:spPr>
           <a:xfrm>
-            <a:off x="0" y="1674021"/>
+            <a:off x="0" y="1627721"/>
             <a:ext cx="1514835" cy="0"/>
           </a:xfrm>
           <a:prstGeom prst="straightConnector1">
@@ -12562,7 +12552,7 @@
         </p:nvSpPr>
         <p:spPr>
           <a:xfrm>
-            <a:off x="231467" y="1423480"/>
+            <a:off x="231467" y="1385025"/>
             <a:ext cx="1264490" cy="184794"/>
           </a:xfrm>
           <a:prstGeom prst="rect">

</xml_diff>

<commit_message>
Fix another error in sequence diagram
</commit_message>
<xml_diff>
--- a/docs/diagrams/FolderOperationsSequenceDiagrams.pptx
+++ b/docs/diagrams/FolderOperationsSequenceDiagrams.pptx
@@ -211,7 +211,7 @@
           <a:p>
             <a:fld id="{F5CC4B3F-88C1-4FFA-B1B6-F41C21DC6924}" type="datetimeFigureOut">
               <a:rPr lang="en-US" smtClean="0"/>
-              <a:t>3/30/2019</a:t>
+              <a:t>3/31/2019</a:t>
             </a:fld>
             <a:endParaRPr lang="en-US"/>
           </a:p>
@@ -1013,7 +1013,7 @@
           <a:p>
             <a:fld id="{78C97017-6FC3-485B-9764-EAC9E56C1D49}" type="datetimeFigureOut">
               <a:rPr lang="en-US" smtClean="0"/>
-              <a:t>3/30/2019</a:t>
+              <a:t>3/31/2019</a:t>
             </a:fld>
             <a:endParaRPr lang="en-US"/>
           </a:p>
@@ -1181,7 +1181,7 @@
           <a:p>
             <a:fld id="{78C97017-6FC3-485B-9764-EAC9E56C1D49}" type="datetimeFigureOut">
               <a:rPr lang="en-US" smtClean="0"/>
-              <a:t>3/30/2019</a:t>
+              <a:t>3/31/2019</a:t>
             </a:fld>
             <a:endParaRPr lang="en-US"/>
           </a:p>
@@ -1359,7 +1359,7 @@
           <a:p>
             <a:fld id="{78C97017-6FC3-485B-9764-EAC9E56C1D49}" type="datetimeFigureOut">
               <a:rPr lang="en-US" smtClean="0"/>
-              <a:t>3/30/2019</a:t>
+              <a:t>3/31/2019</a:t>
             </a:fld>
             <a:endParaRPr lang="en-US"/>
           </a:p>
@@ -1527,7 +1527,7 @@
           <a:p>
             <a:fld id="{78C97017-6FC3-485B-9764-EAC9E56C1D49}" type="datetimeFigureOut">
               <a:rPr lang="en-US" smtClean="0"/>
-              <a:t>3/30/2019</a:t>
+              <a:t>3/31/2019</a:t>
             </a:fld>
             <a:endParaRPr lang="en-US"/>
           </a:p>
@@ -1772,7 +1772,7 @@
           <a:p>
             <a:fld id="{78C97017-6FC3-485B-9764-EAC9E56C1D49}" type="datetimeFigureOut">
               <a:rPr lang="en-US" smtClean="0"/>
-              <a:t>3/30/2019</a:t>
+              <a:t>3/31/2019</a:t>
             </a:fld>
             <a:endParaRPr lang="en-US"/>
           </a:p>
@@ -2057,7 +2057,7 @@
           <a:p>
             <a:fld id="{78C97017-6FC3-485B-9764-EAC9E56C1D49}" type="datetimeFigureOut">
               <a:rPr lang="en-US" smtClean="0"/>
-              <a:t>3/30/2019</a:t>
+              <a:t>3/31/2019</a:t>
             </a:fld>
             <a:endParaRPr lang="en-US"/>
           </a:p>
@@ -2476,7 +2476,7 @@
           <a:p>
             <a:fld id="{78C97017-6FC3-485B-9764-EAC9E56C1D49}" type="datetimeFigureOut">
               <a:rPr lang="en-US" smtClean="0"/>
-              <a:t>3/30/2019</a:t>
+              <a:t>3/31/2019</a:t>
             </a:fld>
             <a:endParaRPr lang="en-US"/>
           </a:p>
@@ -2593,7 +2593,7 @@
           <a:p>
             <a:fld id="{78C97017-6FC3-485B-9764-EAC9E56C1D49}" type="datetimeFigureOut">
               <a:rPr lang="en-US" smtClean="0"/>
-              <a:t>3/30/2019</a:t>
+              <a:t>3/31/2019</a:t>
             </a:fld>
             <a:endParaRPr lang="en-US"/>
           </a:p>
@@ -2688,7 +2688,7 @@
           <a:p>
             <a:fld id="{78C97017-6FC3-485B-9764-EAC9E56C1D49}" type="datetimeFigureOut">
               <a:rPr lang="en-US" smtClean="0"/>
-              <a:t>3/30/2019</a:t>
+              <a:t>3/31/2019</a:t>
             </a:fld>
             <a:endParaRPr lang="en-US"/>
           </a:p>
@@ -2963,7 +2963,7 @@
           <a:p>
             <a:fld id="{78C97017-6FC3-485B-9764-EAC9E56C1D49}" type="datetimeFigureOut">
               <a:rPr lang="en-US" smtClean="0"/>
-              <a:t>3/30/2019</a:t>
+              <a:t>3/31/2019</a:t>
             </a:fld>
             <a:endParaRPr lang="en-US"/>
           </a:p>
@@ -3215,7 +3215,7 @@
           <a:p>
             <a:fld id="{78C97017-6FC3-485B-9764-EAC9E56C1D49}" type="datetimeFigureOut">
               <a:rPr lang="en-US" smtClean="0"/>
-              <a:t>3/30/2019</a:t>
+              <a:t>3/31/2019</a:t>
             </a:fld>
             <a:endParaRPr lang="en-US"/>
           </a:p>
@@ -3426,7 +3426,7 @@
           <a:p>
             <a:fld id="{78C97017-6FC3-485B-9764-EAC9E56C1D49}" type="datetimeFigureOut">
               <a:rPr lang="en-US" smtClean="0"/>
-              <a:t>3/30/2019</a:t>
+              <a:t>3/31/2019</a:t>
             </a:fld>
             <a:endParaRPr lang="en-US"/>
           </a:p>
@@ -12696,7 +12696,7 @@
                   <a:schemeClr val="bg1"/>
                 </a:solidFill>
               </a:rPr>
-              <a:t>fullScreenPlaceHolder:StackPane</a:t>
+              <a:t>fullScreenPlaceholder:StackPane</a:t>
             </a:r>
             <a:endParaRPr lang="en-SG" sz="1400" dirty="0">
               <a:solidFill>

</xml_diff>